<commit_message>
change ml mockup to linear regression
</commit_message>
<xml_diff>
--- a/Mockups/ML_mockup.pptx
+++ b/Mockups/ML_mockup.pptx
@@ -288,7 +288,7 @@
           <a:p>
             <a:fld id="{43F5401B-A4FF-486A-A163-DD1E269CDD80}" type="datetimeFigureOut">
               <a:rPr lang="en-US" smtClean="0"/>
-              <a:t>3/9/2022</a:t>
+              <a:t>3/11/2022</a:t>
             </a:fld>
             <a:endParaRPr lang="en-US"/>
           </a:p>
@@ -458,7 +458,7 @@
           <a:p>
             <a:fld id="{43F5401B-A4FF-486A-A163-DD1E269CDD80}" type="datetimeFigureOut">
               <a:rPr lang="en-US" smtClean="0"/>
-              <a:t>3/9/2022</a:t>
+              <a:t>3/11/2022</a:t>
             </a:fld>
             <a:endParaRPr lang="en-US"/>
           </a:p>
@@ -638,7 +638,7 @@
           <a:p>
             <a:fld id="{43F5401B-A4FF-486A-A163-DD1E269CDD80}" type="datetimeFigureOut">
               <a:rPr lang="en-US" smtClean="0"/>
-              <a:t>3/9/2022</a:t>
+              <a:t>3/11/2022</a:t>
             </a:fld>
             <a:endParaRPr lang="en-US"/>
           </a:p>
@@ -808,7 +808,7 @@
           <a:p>
             <a:fld id="{43F5401B-A4FF-486A-A163-DD1E269CDD80}" type="datetimeFigureOut">
               <a:rPr lang="en-US" smtClean="0"/>
-              <a:t>3/9/2022</a:t>
+              <a:t>3/11/2022</a:t>
             </a:fld>
             <a:endParaRPr lang="en-US"/>
           </a:p>
@@ -1054,7 +1054,7 @@
           <a:p>
             <a:fld id="{43F5401B-A4FF-486A-A163-DD1E269CDD80}" type="datetimeFigureOut">
               <a:rPr lang="en-US" smtClean="0"/>
-              <a:t>3/9/2022</a:t>
+              <a:t>3/11/2022</a:t>
             </a:fld>
             <a:endParaRPr lang="en-US"/>
           </a:p>
@@ -1342,7 +1342,7 @@
           <a:p>
             <a:fld id="{43F5401B-A4FF-486A-A163-DD1E269CDD80}" type="datetimeFigureOut">
               <a:rPr lang="en-US" smtClean="0"/>
-              <a:t>3/9/2022</a:t>
+              <a:t>3/11/2022</a:t>
             </a:fld>
             <a:endParaRPr lang="en-US"/>
           </a:p>
@@ -1764,7 +1764,7 @@
           <a:p>
             <a:fld id="{43F5401B-A4FF-486A-A163-DD1E269CDD80}" type="datetimeFigureOut">
               <a:rPr lang="en-US" smtClean="0"/>
-              <a:t>3/9/2022</a:t>
+              <a:t>3/11/2022</a:t>
             </a:fld>
             <a:endParaRPr lang="en-US"/>
           </a:p>
@@ -1882,7 +1882,7 @@
           <a:p>
             <a:fld id="{43F5401B-A4FF-486A-A163-DD1E269CDD80}" type="datetimeFigureOut">
               <a:rPr lang="en-US" smtClean="0"/>
-              <a:t>3/9/2022</a:t>
+              <a:t>3/11/2022</a:t>
             </a:fld>
             <a:endParaRPr lang="en-US"/>
           </a:p>
@@ -1977,7 +1977,7 @@
           <a:p>
             <a:fld id="{43F5401B-A4FF-486A-A163-DD1E269CDD80}" type="datetimeFigureOut">
               <a:rPr lang="en-US" smtClean="0"/>
-              <a:t>3/9/2022</a:t>
+              <a:t>3/11/2022</a:t>
             </a:fld>
             <a:endParaRPr lang="en-US"/>
           </a:p>
@@ -2254,7 +2254,7 @@
           <a:p>
             <a:fld id="{43F5401B-A4FF-486A-A163-DD1E269CDD80}" type="datetimeFigureOut">
               <a:rPr lang="en-US" smtClean="0"/>
-              <a:t>3/9/2022</a:t>
+              <a:t>3/11/2022</a:t>
             </a:fld>
             <a:endParaRPr lang="en-US"/>
           </a:p>
@@ -2507,7 +2507,7 @@
           <a:p>
             <a:fld id="{43F5401B-A4FF-486A-A163-DD1E269CDD80}" type="datetimeFigureOut">
               <a:rPr lang="en-US" smtClean="0"/>
-              <a:t>3/9/2022</a:t>
+              <a:t>3/11/2022</a:t>
             </a:fld>
             <a:endParaRPr lang="en-US"/>
           </a:p>
@@ -2720,7 +2720,7 @@
           <a:p>
             <a:fld id="{43F5401B-A4FF-486A-A163-DD1E269CDD80}" type="datetimeFigureOut">
               <a:rPr lang="en-US" smtClean="0"/>
-              <a:t>3/9/2022</a:t>
+              <a:t>3/11/2022</a:t>
             </a:fld>
             <a:endParaRPr lang="en-US"/>
           </a:p>
@@ -3606,8 +3606,8 @@
         </p:nvSpPr>
         <p:spPr>
           <a:xfrm>
-            <a:off x="228600" y="4495800"/>
-            <a:ext cx="1752600" cy="1828800"/>
+            <a:off x="228600" y="4079214"/>
+            <a:ext cx="1752600" cy="2348530"/>
           </a:xfrm>
           <a:prstGeom prst="flowChartProcess">
             <a:avLst/>
@@ -3635,9 +3635,14 @@
           <a:p>
             <a:pPr algn="ctr"/>
             <a:r>
-              <a:rPr lang="en-US" dirty="0" smtClean="0"/>
-              <a:t>Data Cleaning</a:t>
-            </a:r>
+              <a:rPr lang="en-US" sz="1600" dirty="0" smtClean="0"/>
+              <a:t>Data </a:t>
+            </a:r>
+            <a:r>
+              <a:rPr lang="en-US" sz="1600" dirty="0" smtClean="0"/>
+              <a:t>Cleaning</a:t>
+            </a:r>
+            <a:endParaRPr lang="en-US" sz="1600" dirty="0" smtClean="0"/>
           </a:p>
           <a:p>
             <a:pPr marL="342900" indent="-342900" algn="ctr">
@@ -3646,7 +3651,7 @@
             </a:pPr>
             <a:r>
               <a:rPr lang="en-US" sz="1200" dirty="0" smtClean="0"/>
-              <a:t>Add target column (y)</a:t>
+              <a:t>Drop all rows besides “United States”</a:t>
             </a:r>
           </a:p>
           <a:p>
@@ -3656,7 +3661,15 @@
             </a:pPr>
             <a:r>
               <a:rPr lang="en-US" sz="1200" dirty="0" smtClean="0"/>
-              <a:t>Feature Engineering</a:t>
+              <a:t>Drop all rows besides “</a:t>
+            </a:r>
+            <a:r>
+              <a:rPr lang="en-US" sz="1200" dirty="0" err="1" smtClean="0"/>
+              <a:t>suicide_year</a:t>
+            </a:r>
+            <a:r>
+              <a:rPr lang="en-US" sz="1200" dirty="0" smtClean="0"/>
+              <a:t>” 2005-2015</a:t>
             </a:r>
             <a:endParaRPr lang="en-US" sz="1200" dirty="0" smtClean="0"/>
           </a:p>
@@ -3678,7 +3691,6 @@
               <a:rPr lang="en-US" sz="1200" dirty="0" smtClean="0"/>
               <a:t>Drop unneeded column(s)</a:t>
             </a:r>
-            <a:endParaRPr lang="en-US" sz="1200" dirty="0" smtClean="0"/>
           </a:p>
           <a:p>
             <a:pPr marL="342900" indent="-342900" algn="ctr">
@@ -3689,7 +3701,6 @@
               <a:rPr lang="en-US" sz="1200" dirty="0" smtClean="0"/>
               <a:t>Binary Encoding</a:t>
             </a:r>
-            <a:endParaRPr lang="en-US" sz="1200" dirty="0" smtClean="0"/>
           </a:p>
         </p:txBody>
       </p:sp>
@@ -3702,7 +3713,7 @@
         <p:spPr>
           <a:xfrm>
             <a:off x="2409833" y="4648200"/>
-            <a:ext cx="1659339" cy="1344260"/>
+            <a:ext cx="1659339" cy="1524000"/>
           </a:xfrm>
           <a:prstGeom prst="flowChartProcess">
             <a:avLst/>
@@ -3725,15 +3736,26 @@
           </a:fontRef>
         </p:style>
         <p:txBody>
-          <a:bodyPr rtlCol="0" anchor="ctr"/>
+          <a:bodyPr rtlCol="0" anchor="t"/>
           <a:lstStyle/>
           <a:p>
             <a:pPr algn="ctr"/>
             <a:r>
-              <a:rPr lang="en-US" dirty="0" smtClean="0"/>
-              <a:t>Split Data into Training and Testing</a:t>
-            </a:r>
-            <a:endParaRPr lang="en-US" dirty="0"/>
+              <a:rPr lang="en-US" sz="1600" dirty="0" smtClean="0"/>
+              <a:t>Split Data into Training and </a:t>
+            </a:r>
+            <a:r>
+              <a:rPr lang="en-US" sz="1600" dirty="0" smtClean="0"/>
+              <a:t>Testing</a:t>
+            </a:r>
+          </a:p>
+          <a:p>
+            <a:pPr algn="ctr"/>
+            <a:r>
+              <a:rPr lang="en-US" sz="1200" dirty="0" smtClean="0"/>
+              <a:t>1. Train the first 7 years, then test the last 3 years</a:t>
+            </a:r>
+            <a:endParaRPr lang="en-US" sz="1200" dirty="0"/>
           </a:p>
         </p:txBody>
       </p:sp>
@@ -3745,8 +3767,8 @@
         </p:nvSpPr>
         <p:spPr>
           <a:xfrm>
-            <a:off x="6515100" y="4075245"/>
-            <a:ext cx="2362200" cy="2337770"/>
+            <a:off x="6515100" y="3990777"/>
+            <a:ext cx="2362200" cy="2486223"/>
           </a:xfrm>
           <a:prstGeom prst="flowChartProcess">
             <a:avLst/>
@@ -3769,14 +3791,23 @@
           </a:fontRef>
         </p:style>
         <p:txBody>
-          <a:bodyPr rtlCol="0" anchor="ctr"/>
+          <a:bodyPr rtlCol="0" anchor="t"/>
           <a:lstStyle/>
           <a:p>
             <a:pPr algn="ctr"/>
             <a:r>
-              <a:rPr lang="en-US" dirty="0" smtClean="0"/>
-              <a:t>Random Forest Model </a:t>
-            </a:r>
+              <a:rPr lang="en-US" sz="1400" b="1" dirty="0" smtClean="0"/>
+              <a:t>Linear Regression or Random Forest </a:t>
+            </a:r>
+            <a:r>
+              <a:rPr lang="en-US" sz="1400" b="1" dirty="0" err="1" smtClean="0"/>
+              <a:t>Regressor</a:t>
+            </a:r>
+            <a:r>
+              <a:rPr lang="en-US" sz="1400" b="1" dirty="0" smtClean="0"/>
+              <a:t> Model </a:t>
+            </a:r>
+            <a:endParaRPr lang="en-US" sz="1400" b="1" dirty="0" smtClean="0"/>
           </a:p>
           <a:p>
             <a:pPr marL="342900" indent="-342900" algn="ctr">
@@ -3784,8 +3815,9 @@
             </a:pPr>
             <a:r>
               <a:rPr lang="en-US" sz="1200" dirty="0" smtClean="0"/>
-              <a:t>Fit the model and make predictions using testing data</a:t>
-            </a:r>
+              <a:t>Plot data in scatter plot to observe trend</a:t>
+            </a:r>
+            <a:endParaRPr lang="en-US" sz="1200" dirty="0" smtClean="0"/>
           </a:p>
           <a:p>
             <a:pPr marL="342900" indent="-342900" algn="ctr">
@@ -3793,7 +3825,11 @@
             </a:pPr>
             <a:r>
               <a:rPr lang="en-US" sz="1200" dirty="0" smtClean="0"/>
-              <a:t>Evaluate the model with balance accuracy score, confusion matrix and imbalance classification report</a:t>
+              <a:t>Fit </a:t>
+            </a:r>
+            <a:r>
+              <a:rPr lang="en-US" sz="1200" dirty="0" smtClean="0"/>
+              <a:t>the model and make predictions using testing data</a:t>
             </a:r>
           </a:p>
           <a:p>
@@ -3802,9 +3838,29 @@
             </a:pPr>
             <a:r>
               <a:rPr lang="en-US" sz="1200" dirty="0" smtClean="0"/>
-              <a:t>Calculate feature importance</a:t>
-            </a:r>
-            <a:endParaRPr lang="en-US" sz="1200" dirty="0"/>
+              <a:t>Evaluate the model </a:t>
+            </a:r>
+            <a:r>
+              <a:rPr lang="en-US" sz="1200" dirty="0" smtClean="0"/>
+              <a:t>by calculating training and testing scores with </a:t>
+            </a:r>
+            <a:r>
+              <a:rPr lang="en-US" sz="1200" dirty="0" err="1" smtClean="0"/>
+              <a:t>model.score</a:t>
+            </a:r>
+            <a:r>
+              <a:rPr lang="en-US" sz="1200" dirty="0" smtClean="0"/>
+              <a:t> and examining the </a:t>
+            </a:r>
+            <a:r>
+              <a:rPr lang="en-US" sz="1200" dirty="0" err="1" smtClean="0"/>
+              <a:t>coef</a:t>
+            </a:r>
+            <a:r>
+              <a:rPr lang="en-US" sz="1200" dirty="0" smtClean="0"/>
+              <a:t>_, intercept_, and plotting X and y with fit line</a:t>
+            </a:r>
+            <a:endParaRPr lang="en-US" sz="1200" dirty="0" smtClean="0"/>
           </a:p>
         </p:txBody>
       </p:sp>
@@ -3845,22 +3901,14 @@
           <a:p>
             <a:pPr algn="ctr"/>
             <a:r>
-              <a:rPr lang="en-US" dirty="0" smtClean="0"/>
-              <a:t>Normalize Data using </a:t>
-            </a:r>
-            <a:r>
-              <a:rPr lang="en-US" dirty="0" err="1" smtClean="0"/>
-              <a:t>StandardScaler</a:t>
-            </a:r>
-            <a:r>
-              <a:rPr lang="en-US" dirty="0"/>
-              <a:t> </a:t>
-            </a:r>
-            <a:r>
-              <a:rPr lang="en-US" dirty="0" smtClean="0"/>
-              <a:t>()</a:t>
-            </a:r>
-            <a:endParaRPr lang="en-US" dirty="0"/>
+              <a:rPr lang="en-US" sz="1600" dirty="0" smtClean="0"/>
+              <a:t>Normalize </a:t>
+            </a:r>
+            <a:r>
+              <a:rPr lang="en-US" sz="1600" dirty="0" smtClean="0"/>
+              <a:t>Data</a:t>
+            </a:r>
+            <a:endParaRPr lang="en-US" sz="1600" dirty="0"/>
           </a:p>
         </p:txBody>
       </p:sp>

</xml_diff>

<commit_message>
add changes to types of data used
</commit_message>
<xml_diff>
--- a/Mockups/ML_mockup.pptx
+++ b/Mockups/ML_mockup.pptx
@@ -3539,8 +3539,8 @@
         </p:nvSpPr>
         <p:spPr>
           <a:xfrm>
-            <a:off x="5791200" y="345533"/>
-            <a:ext cx="2370777" cy="553998"/>
+            <a:off x="6108464" y="345533"/>
+            <a:ext cx="1736245" cy="553998"/>
           </a:xfrm>
           <a:prstGeom prst="rect">
             <a:avLst/>
@@ -3560,9 +3560,14 @@
             </a:r>
           </a:p>
           <a:p>
+            <a:pPr algn="ctr"/>
             <a:r>
               <a:rPr lang="en-US" sz="1200" dirty="0" smtClean="0"/>
-              <a:t>(Binary Classification Labeled Data)</a:t>
+              <a:t>(Labeled </a:t>
+            </a:r>
+            <a:r>
+              <a:rPr lang="en-US" sz="1200" dirty="0" smtClean="0"/>
+              <a:t>Data)</a:t>
             </a:r>
             <a:endParaRPr lang="en-US" sz="1200" dirty="0"/>
           </a:p>
@@ -3636,13 +3641,8 @@
             <a:pPr algn="ctr"/>
             <a:r>
               <a:rPr lang="en-US" sz="1600" dirty="0" smtClean="0"/>
-              <a:t>Data </a:t>
-            </a:r>
-            <a:r>
-              <a:rPr lang="en-US" sz="1600" dirty="0" smtClean="0"/>
-              <a:t>Cleaning</a:t>
-            </a:r>
-            <a:endParaRPr lang="en-US" sz="1600" dirty="0" smtClean="0"/>
+              <a:t>Data Cleaning</a:t>
+            </a:r>
           </a:p>
           <a:p>
             <a:pPr marL="342900" indent="-342900" algn="ctr">
@@ -3671,7 +3671,6 @@
               <a:rPr lang="en-US" sz="1200" dirty="0" smtClean="0"/>
               <a:t>” 2005-2015</a:t>
             </a:r>
-            <a:endParaRPr lang="en-US" sz="1200" dirty="0" smtClean="0"/>
           </a:p>
           <a:p>
             <a:pPr marL="342900" indent="-342900" algn="ctr">
@@ -3742,11 +3741,7 @@
             <a:pPr algn="ctr"/>
             <a:r>
               <a:rPr lang="en-US" sz="1600" dirty="0" smtClean="0"/>
-              <a:t>Split Data into Training and </a:t>
-            </a:r>
-            <a:r>
-              <a:rPr lang="en-US" sz="1600" dirty="0" smtClean="0"/>
-              <a:t>Testing</a:t>
+              <a:t>Split Data into Training and Testing</a:t>
             </a:r>
           </a:p>
           <a:p>
@@ -3807,7 +3802,6 @@
               <a:rPr lang="en-US" sz="1400" b="1" dirty="0" smtClean="0"/>
               <a:t> Model </a:t>
             </a:r>
-            <a:endParaRPr lang="en-US" sz="1400" b="1" dirty="0" smtClean="0"/>
           </a:p>
           <a:p>
             <a:pPr marL="342900" indent="-342900" algn="ctr">
@@ -3817,7 +3811,6 @@
               <a:rPr lang="en-US" sz="1200" dirty="0" smtClean="0"/>
               <a:t>Plot data in scatter plot to observe trend</a:t>
             </a:r>
-            <a:endParaRPr lang="en-US" sz="1200" dirty="0" smtClean="0"/>
           </a:p>
           <a:p>
             <a:pPr marL="342900" indent="-342900" algn="ctr">
@@ -3825,11 +3818,7 @@
             </a:pPr>
             <a:r>
               <a:rPr lang="en-US" sz="1200" dirty="0" smtClean="0"/>
-              <a:t>Fit </a:t>
-            </a:r>
-            <a:r>
-              <a:rPr lang="en-US" sz="1200" dirty="0" smtClean="0"/>
-              <a:t>the model and make predictions using testing data</a:t>
+              <a:t>Fit the model and make predictions using testing data</a:t>
             </a:r>
           </a:p>
           <a:p>
@@ -3838,11 +3827,7 @@
             </a:pPr>
             <a:r>
               <a:rPr lang="en-US" sz="1200" dirty="0" smtClean="0"/>
-              <a:t>Evaluate the model </a:t>
-            </a:r>
-            <a:r>
-              <a:rPr lang="en-US" sz="1200" dirty="0" smtClean="0"/>
-              <a:t>by calculating training and testing scores with </a:t>
+              <a:t>Evaluate the model by calculating training and testing scores with </a:t>
             </a:r>
             <a:r>
               <a:rPr lang="en-US" sz="1200" dirty="0" err="1" smtClean="0"/>
@@ -3860,7 +3845,6 @@
               <a:rPr lang="en-US" sz="1200" dirty="0" smtClean="0"/>
               <a:t>_, intercept_, and plotting X and y with fit line</a:t>
             </a:r>
-            <a:endParaRPr lang="en-US" sz="1200" dirty="0" smtClean="0"/>
           </a:p>
         </p:txBody>
       </p:sp>
@@ -3902,11 +3886,7 @@
             <a:pPr algn="ctr"/>
             <a:r>
               <a:rPr lang="en-US" sz="1600" dirty="0" smtClean="0"/>
-              <a:t>Normalize </a:t>
-            </a:r>
-            <a:r>
-              <a:rPr lang="en-US" sz="1600" dirty="0" smtClean="0"/>
-              <a:t>Data</a:t>
+              <a:t>Normalize Data</a:t>
             </a:r>
             <a:endParaRPr lang="en-US" sz="1600" dirty="0"/>
           </a:p>

</xml_diff>

<commit_message>
changes to eda and mockup
</commit_message>
<xml_diff>
--- a/Mockups/ML_mockup.pptx
+++ b/Mockups/ML_mockup.pptx
@@ -288,7 +288,7 @@
           <a:p>
             <a:fld id="{43F5401B-A4FF-486A-A163-DD1E269CDD80}" type="datetimeFigureOut">
               <a:rPr lang="en-US" smtClean="0"/>
-              <a:t>3/11/2022</a:t>
+              <a:t>3/13/2022</a:t>
             </a:fld>
             <a:endParaRPr lang="en-US"/>
           </a:p>
@@ -458,7 +458,7 @@
           <a:p>
             <a:fld id="{43F5401B-A4FF-486A-A163-DD1E269CDD80}" type="datetimeFigureOut">
               <a:rPr lang="en-US" smtClean="0"/>
-              <a:t>3/11/2022</a:t>
+              <a:t>3/13/2022</a:t>
             </a:fld>
             <a:endParaRPr lang="en-US"/>
           </a:p>
@@ -638,7 +638,7 @@
           <a:p>
             <a:fld id="{43F5401B-A4FF-486A-A163-DD1E269CDD80}" type="datetimeFigureOut">
               <a:rPr lang="en-US" smtClean="0"/>
-              <a:t>3/11/2022</a:t>
+              <a:t>3/13/2022</a:t>
             </a:fld>
             <a:endParaRPr lang="en-US"/>
           </a:p>
@@ -808,7 +808,7 @@
           <a:p>
             <a:fld id="{43F5401B-A4FF-486A-A163-DD1E269CDD80}" type="datetimeFigureOut">
               <a:rPr lang="en-US" smtClean="0"/>
-              <a:t>3/11/2022</a:t>
+              <a:t>3/13/2022</a:t>
             </a:fld>
             <a:endParaRPr lang="en-US"/>
           </a:p>
@@ -1054,7 +1054,7 @@
           <a:p>
             <a:fld id="{43F5401B-A4FF-486A-A163-DD1E269CDD80}" type="datetimeFigureOut">
               <a:rPr lang="en-US" smtClean="0"/>
-              <a:t>3/11/2022</a:t>
+              <a:t>3/13/2022</a:t>
             </a:fld>
             <a:endParaRPr lang="en-US"/>
           </a:p>
@@ -1342,7 +1342,7 @@
           <a:p>
             <a:fld id="{43F5401B-A4FF-486A-A163-DD1E269CDD80}" type="datetimeFigureOut">
               <a:rPr lang="en-US" smtClean="0"/>
-              <a:t>3/11/2022</a:t>
+              <a:t>3/13/2022</a:t>
             </a:fld>
             <a:endParaRPr lang="en-US"/>
           </a:p>
@@ -1764,7 +1764,7 @@
           <a:p>
             <a:fld id="{43F5401B-A4FF-486A-A163-DD1E269CDD80}" type="datetimeFigureOut">
               <a:rPr lang="en-US" smtClean="0"/>
-              <a:t>3/11/2022</a:t>
+              <a:t>3/13/2022</a:t>
             </a:fld>
             <a:endParaRPr lang="en-US"/>
           </a:p>
@@ -1882,7 +1882,7 @@
           <a:p>
             <a:fld id="{43F5401B-A4FF-486A-A163-DD1E269CDD80}" type="datetimeFigureOut">
               <a:rPr lang="en-US" smtClean="0"/>
-              <a:t>3/11/2022</a:t>
+              <a:t>3/13/2022</a:t>
             </a:fld>
             <a:endParaRPr lang="en-US"/>
           </a:p>
@@ -1977,7 +1977,7 @@
           <a:p>
             <a:fld id="{43F5401B-A4FF-486A-A163-DD1E269CDD80}" type="datetimeFigureOut">
               <a:rPr lang="en-US" smtClean="0"/>
-              <a:t>3/11/2022</a:t>
+              <a:t>3/13/2022</a:t>
             </a:fld>
             <a:endParaRPr lang="en-US"/>
           </a:p>
@@ -2254,7 +2254,7 @@
           <a:p>
             <a:fld id="{43F5401B-A4FF-486A-A163-DD1E269CDD80}" type="datetimeFigureOut">
               <a:rPr lang="en-US" smtClean="0"/>
-              <a:t>3/11/2022</a:t>
+              <a:t>3/13/2022</a:t>
             </a:fld>
             <a:endParaRPr lang="en-US"/>
           </a:p>
@@ -2507,7 +2507,7 @@
           <a:p>
             <a:fld id="{43F5401B-A4FF-486A-A163-DD1E269CDD80}" type="datetimeFigureOut">
               <a:rPr lang="en-US" smtClean="0"/>
-              <a:t>3/11/2022</a:t>
+              <a:t>3/13/2022</a:t>
             </a:fld>
             <a:endParaRPr lang="en-US"/>
           </a:p>
@@ -2720,7 +2720,7 @@
           <a:p>
             <a:fld id="{43F5401B-A4FF-486A-A163-DD1E269CDD80}" type="datetimeFigureOut">
               <a:rPr lang="en-US" smtClean="0"/>
-              <a:t>3/11/2022</a:t>
+              <a:t>3/13/2022</a:t>
             </a:fld>
             <a:endParaRPr lang="en-US"/>
           </a:p>
@@ -3563,11 +3563,7 @@
             <a:pPr algn="ctr"/>
             <a:r>
               <a:rPr lang="en-US" sz="1200" dirty="0" smtClean="0"/>
-              <a:t>(Labeled </a:t>
-            </a:r>
-            <a:r>
-              <a:rPr lang="en-US" sz="1200" dirty="0" smtClean="0"/>
-              <a:t>Data)</a:t>
+              <a:t>(Labeled Data)</a:t>
             </a:r>
             <a:endParaRPr lang="en-US" sz="1200" dirty="0"/>
           </a:p>
@@ -3612,7 +3608,7 @@
         <p:spPr>
           <a:xfrm>
             <a:off x="228600" y="4079214"/>
-            <a:ext cx="1752600" cy="2348530"/>
+            <a:ext cx="1752600" cy="2397786"/>
           </a:xfrm>
           <a:prstGeom prst="flowChartProcess">
             <a:avLst/>
@@ -3698,8 +3694,13 @@
             </a:pPr>
             <a:r>
               <a:rPr lang="en-US" sz="1200" dirty="0" smtClean="0"/>
-              <a:t>Binary Encoding</a:t>
-            </a:r>
+              <a:t>Encoding with </a:t>
+            </a:r>
+            <a:r>
+              <a:rPr lang="en-US" sz="1200" dirty="0" err="1" smtClean="0"/>
+              <a:t>OneHotEncoder</a:t>
+            </a:r>
+            <a:endParaRPr lang="en-US" sz="1200" dirty="0" smtClean="0"/>
           </a:p>
         </p:txBody>
       </p:sp>
@@ -3748,7 +3749,15 @@
             <a:pPr algn="ctr"/>
             <a:r>
               <a:rPr lang="en-US" sz="1200" dirty="0" smtClean="0"/>
-              <a:t>1. Train the first 7 years, then test the last 3 years</a:t>
+              <a:t>1. Train the first </a:t>
+            </a:r>
+            <a:r>
+              <a:rPr lang="en-US" sz="1200" dirty="0" smtClean="0"/>
+              <a:t>8 </a:t>
+            </a:r>
+            <a:r>
+              <a:rPr lang="en-US" sz="1200" dirty="0" smtClean="0"/>
+              <a:t>years, then test the last 3 years</a:t>
             </a:r>
             <a:endParaRPr lang="en-US" sz="1200" dirty="0"/>
           </a:p>
@@ -3827,7 +3836,15 @@
             </a:pPr>
             <a:r>
               <a:rPr lang="en-US" sz="1200" dirty="0" smtClean="0"/>
-              <a:t>Evaluate the model by calculating training and testing scores with </a:t>
+              <a:t>Evaluate the model by calculating </a:t>
+            </a:r>
+            <a:r>
+              <a:rPr lang="en-US" sz="1200" dirty="0" smtClean="0"/>
+              <a:t>MSE and R-squared, training </a:t>
+            </a:r>
+            <a:r>
+              <a:rPr lang="en-US" sz="1200" dirty="0" smtClean="0"/>
+              <a:t>and testing scores with </a:t>
             </a:r>
             <a:r>
               <a:rPr lang="en-US" sz="1200" dirty="0" err="1" smtClean="0"/>
@@ -3835,16 +3852,21 @@
             </a:r>
             <a:r>
               <a:rPr lang="en-US" sz="1200" dirty="0" smtClean="0"/>
-              <a:t> and examining the </a:t>
-            </a:r>
-            <a:r>
-              <a:rPr lang="en-US" sz="1200" dirty="0" err="1" smtClean="0"/>
-              <a:t>coef</a:t>
+              <a:t>, </a:t>
             </a:r>
             <a:r>
               <a:rPr lang="en-US" sz="1200" dirty="0" smtClean="0"/>
-              <a:t>_, intercept_, and plotting X and y with fit line</a:t>
-            </a:r>
+              <a:t>and </a:t>
+            </a:r>
+            <a:r>
+              <a:rPr lang="en-US" sz="1200" dirty="0" smtClean="0"/>
+              <a:t>plotting </a:t>
+            </a:r>
+            <a:r>
+              <a:rPr lang="en-US" sz="1200" dirty="0" smtClean="0"/>
+              <a:t>residuals</a:t>
+            </a:r>
+            <a:endParaRPr lang="en-US" sz="1200" dirty="0" smtClean="0"/>
           </a:p>
         </p:txBody>
       </p:sp>
@@ -3886,7 +3908,15 @@
             <a:pPr algn="ctr"/>
             <a:r>
               <a:rPr lang="en-US" sz="1600" dirty="0" smtClean="0"/>
-              <a:t>Normalize Data</a:t>
+              <a:t>Normalize </a:t>
+            </a:r>
+            <a:r>
+              <a:rPr lang="en-US" sz="1600" dirty="0" smtClean="0"/>
+              <a:t>Data using </a:t>
+            </a:r>
+            <a:r>
+              <a:rPr lang="en-US" sz="1600" dirty="0" err="1" smtClean="0"/>
+              <a:t>StandardScaler</a:t>
             </a:r>
             <a:endParaRPr lang="en-US" sz="1600" dirty="0"/>
           </a:p>

</xml_diff>